<commit_message>
update GQM and glossary
</commit_message>
<xml_diff>
--- a/devoir2/WenhaoXU_20150702_ManpingLI_968527/GQM plan.pptx
+++ b/devoir2/WenhaoXU_20150702_ManpingLI_968527/GQM plan.pptx
@@ -104,6 +104,11 @@
       </a:defRPr>
     </a:lvl9pPr>
   </p:defaultTextStyle>
+  <p:extLst>
+    <p:ext uri="{EFAFB233-063F-42B5-8137-9DF3F51BA10A}">
+      <p15:sldGuideLst xmlns:p15="http://schemas.microsoft.com/office/powerpoint/2012/main"/>
+    </p:ext>
+  </p:extLst>
 </p:presentation>
 </file>
 
@@ -262,7 +267,7 @@
           <a:p>
             <a:fld id="{6D0E7609-1A7C-1E43-81AD-3B15F6EC7206}" type="datetimeFigureOut">
               <a:rPr lang="en-US" smtClean="0"/>
-              <a:t>10/19/22</a:t>
+              <a:t>10/20/22</a:t>
             </a:fld>
             <a:endParaRPr lang="en-US"/>
           </a:p>
@@ -460,7 +465,7 @@
           <a:p>
             <a:fld id="{6D0E7609-1A7C-1E43-81AD-3B15F6EC7206}" type="datetimeFigureOut">
               <a:rPr lang="en-US" smtClean="0"/>
-              <a:t>10/19/22</a:t>
+              <a:t>10/20/22</a:t>
             </a:fld>
             <a:endParaRPr lang="en-US"/>
           </a:p>
@@ -668,7 +673,7 @@
           <a:p>
             <a:fld id="{6D0E7609-1A7C-1E43-81AD-3B15F6EC7206}" type="datetimeFigureOut">
               <a:rPr lang="en-US" smtClean="0"/>
-              <a:t>10/19/22</a:t>
+              <a:t>10/20/22</a:t>
             </a:fld>
             <a:endParaRPr lang="en-US"/>
           </a:p>
@@ -866,7 +871,7 @@
           <a:p>
             <a:fld id="{6D0E7609-1A7C-1E43-81AD-3B15F6EC7206}" type="datetimeFigureOut">
               <a:rPr lang="en-US" smtClean="0"/>
-              <a:t>10/19/22</a:t>
+              <a:t>10/20/22</a:t>
             </a:fld>
             <a:endParaRPr lang="en-US"/>
           </a:p>
@@ -1141,7 +1146,7 @@
           <a:p>
             <a:fld id="{6D0E7609-1A7C-1E43-81AD-3B15F6EC7206}" type="datetimeFigureOut">
               <a:rPr lang="en-US" smtClean="0"/>
-              <a:t>10/19/22</a:t>
+              <a:t>10/20/22</a:t>
             </a:fld>
             <a:endParaRPr lang="en-US"/>
           </a:p>
@@ -1406,7 +1411,7 @@
           <a:p>
             <a:fld id="{6D0E7609-1A7C-1E43-81AD-3B15F6EC7206}" type="datetimeFigureOut">
               <a:rPr lang="en-US" smtClean="0"/>
-              <a:t>10/19/22</a:t>
+              <a:t>10/20/22</a:t>
             </a:fld>
             <a:endParaRPr lang="en-US"/>
           </a:p>
@@ -1818,7 +1823,7 @@
           <a:p>
             <a:fld id="{6D0E7609-1A7C-1E43-81AD-3B15F6EC7206}" type="datetimeFigureOut">
               <a:rPr lang="en-US" smtClean="0"/>
-              <a:t>10/19/22</a:t>
+              <a:t>10/20/22</a:t>
             </a:fld>
             <a:endParaRPr lang="en-US"/>
           </a:p>
@@ -1959,7 +1964,7 @@
           <a:p>
             <a:fld id="{6D0E7609-1A7C-1E43-81AD-3B15F6EC7206}" type="datetimeFigureOut">
               <a:rPr lang="en-US" smtClean="0"/>
-              <a:t>10/19/22</a:t>
+              <a:t>10/20/22</a:t>
             </a:fld>
             <a:endParaRPr lang="en-US"/>
           </a:p>
@@ -2072,7 +2077,7 @@
           <a:p>
             <a:fld id="{6D0E7609-1A7C-1E43-81AD-3B15F6EC7206}" type="datetimeFigureOut">
               <a:rPr lang="en-US" smtClean="0"/>
-              <a:t>10/19/22</a:t>
+              <a:t>10/20/22</a:t>
             </a:fld>
             <a:endParaRPr lang="en-US"/>
           </a:p>
@@ -2383,7 +2388,7 @@
           <a:p>
             <a:fld id="{6D0E7609-1A7C-1E43-81AD-3B15F6EC7206}" type="datetimeFigureOut">
               <a:rPr lang="en-US" smtClean="0"/>
-              <a:t>10/19/22</a:t>
+              <a:t>10/20/22</a:t>
             </a:fld>
             <a:endParaRPr lang="en-US"/>
           </a:p>
@@ -2671,7 +2676,7 @@
           <a:p>
             <a:fld id="{6D0E7609-1A7C-1E43-81AD-3B15F6EC7206}" type="datetimeFigureOut">
               <a:rPr lang="en-US" smtClean="0"/>
-              <a:t>10/19/22</a:t>
+              <a:t>10/20/22</a:t>
             </a:fld>
             <a:endParaRPr lang="en-US"/>
           </a:p>
@@ -2912,7 +2917,7 @@
           <a:p>
             <a:fld id="{6D0E7609-1A7C-1E43-81AD-3B15F6EC7206}" type="datetimeFigureOut">
               <a:rPr lang="en-US" smtClean="0"/>
-              <a:t>10/19/22</a:t>
+              <a:t>10/20/22</a:t>
             </a:fld>
             <a:endParaRPr lang="en-US"/>
           </a:p>
@@ -3394,55 +3399,7 @@
           <a:p>
             <a:r>
               <a:rPr lang="en-US" dirty="0"/>
-              <a:t>Le </a:t>
-            </a:r>
-            <a:r>
-              <a:rPr lang="en-US" dirty="0" err="1"/>
-              <a:t>niveau</a:t>
-            </a:r>
-            <a:r>
-              <a:rPr lang="en-US" dirty="0"/>
-              <a:t> de documentation des classes </a:t>
-            </a:r>
-            <a:r>
-              <a:rPr lang="en-US" dirty="0" err="1"/>
-              <a:t>est</a:t>
-            </a:r>
-            <a:r>
-              <a:rPr lang="en-US" dirty="0"/>
-              <a:t>-il </a:t>
-            </a:r>
-            <a:r>
-              <a:rPr lang="en-US" dirty="0" err="1"/>
-              <a:t>approprié</a:t>
-            </a:r>
-            <a:r>
-              <a:rPr lang="en-US" dirty="0"/>
-              <a:t> </a:t>
-            </a:r>
-            <a:r>
-              <a:rPr lang="en-US" dirty="0" err="1"/>
-              <a:t>à</a:t>
-            </a:r>
-            <a:r>
-              <a:rPr lang="en-US" dirty="0"/>
-              <a:t> </a:t>
-            </a:r>
-            <a:r>
-              <a:rPr lang="en-US" dirty="0" err="1"/>
-              <a:t>leur</a:t>
-            </a:r>
-            <a:r>
-              <a:rPr lang="en-US" dirty="0"/>
-              <a:t> </a:t>
-            </a:r>
-            <a:r>
-              <a:rPr lang="en-US" dirty="0" err="1"/>
-              <a:t>complexité</a:t>
-            </a:r>
-            <a:r>
-              <a:rPr lang="en-US" dirty="0"/>
-              <a:t>?</a:t>
+              <a:t>Le niveau de documentation des classes est-il approprié à leur complexité?</a:t>
             </a:r>
           </a:p>
         </p:txBody>
@@ -3462,7 +3419,7 @@
         <p:spPr>
           <a:xfrm>
             <a:off x="4304270" y="1383957"/>
-            <a:ext cx="1791730" cy="923330"/>
+            <a:ext cx="1491194" cy="923330"/>
           </a:xfrm>
           <a:prstGeom prst="rect">
             <a:avLst/>
@@ -3477,23 +3434,7 @@
           <a:p>
             <a:r>
               <a:rPr lang="en-US" dirty="0"/>
-              <a:t>La conception </a:t>
-            </a:r>
-            <a:r>
-              <a:rPr lang="en-US" dirty="0" err="1"/>
-              <a:t>est-elle</a:t>
-            </a:r>
-            <a:r>
-              <a:rPr lang="en-US" dirty="0"/>
-              <a:t> bien </a:t>
-            </a:r>
-            <a:r>
-              <a:rPr lang="en-US" dirty="0" err="1"/>
-              <a:t>modulaire</a:t>
-            </a:r>
-            <a:r>
-              <a:rPr lang="en-US" dirty="0"/>
-              <a:t>?</a:t>
+              <a:t>La conception est-elle bien modulaire?</a:t>
             </a:r>
           </a:p>
         </p:txBody>
@@ -3528,15 +3469,7 @@
           <a:p>
             <a:r>
               <a:rPr lang="en-US" dirty="0"/>
-              <a:t>Le code </a:t>
-            </a:r>
-            <a:r>
-              <a:rPr lang="en-US" dirty="0" err="1"/>
-              <a:t>est</a:t>
-            </a:r>
-            <a:r>
-              <a:rPr lang="en-US" dirty="0"/>
-              <a:t>-il mature?</a:t>
+              <a:t>Le code est-il mature?</a:t>
             </a:r>
           </a:p>
         </p:txBody>
@@ -3571,39 +3504,7 @@
           <a:p>
             <a:r>
               <a:rPr lang="en-US" dirty="0"/>
-              <a:t>Le code </a:t>
-            </a:r>
-            <a:r>
-              <a:rPr lang="en-US" dirty="0" err="1"/>
-              <a:t>peut</a:t>
-            </a:r>
-            <a:r>
-              <a:rPr lang="en-US" dirty="0"/>
-              <a:t>-il </a:t>
-            </a:r>
-            <a:r>
-              <a:rPr lang="en-US" dirty="0" err="1"/>
-              <a:t>être</a:t>
-            </a:r>
-            <a:r>
-              <a:rPr lang="en-US" dirty="0"/>
-              <a:t> </a:t>
-            </a:r>
-            <a:r>
-              <a:rPr lang="en-US" dirty="0" err="1"/>
-              <a:t>testé</a:t>
-            </a:r>
-            <a:r>
-              <a:rPr lang="en-US" dirty="0"/>
-              <a:t> bien </a:t>
-            </a:r>
-            <a:r>
-              <a:rPr lang="en-US" dirty="0" err="1"/>
-              <a:t>automatiquement</a:t>
-            </a:r>
-            <a:r>
-              <a:rPr lang="en-US" dirty="0"/>
-              <a:t>?</a:t>
+              <a:t>Le code peut-il être testé bien automatiquement?</a:t>
             </a:r>
           </a:p>
         </p:txBody>
@@ -3660,6 +3561,7 @@
             </a:extLst>
           </p:cNvPr>
           <p:cNvCxnSpPr>
+            <a:cxnSpLocks/>
             <a:stCxn id="4" idx="2"/>
             <a:endCxn id="6" idx="0"/>
           </p:cNvCxnSpPr>
@@ -3667,8 +3569,8 @@
         </p:nvCxnSpPr>
         <p:spPr>
           <a:xfrm flipH="1">
-            <a:off x="5200135" y="999526"/>
-            <a:ext cx="539578" cy="384431"/>
+            <a:off x="5049867" y="999526"/>
+            <a:ext cx="689846" cy="384431"/>
           </a:xfrm>
           <a:prstGeom prst="straightConnector1">
             <a:avLst/>
@@ -3790,7 +3692,7 @@
         </p:nvSpPr>
         <p:spPr>
           <a:xfrm>
-            <a:off x="2174788" y="3193194"/>
+            <a:off x="1775399" y="3193194"/>
             <a:ext cx="840259" cy="369332"/>
           </a:xfrm>
           <a:prstGeom prst="rect">
@@ -3813,10 +3715,10 @@
       </p:sp>
       <p:sp>
         <p:nvSpPr>
-          <p:cNvPr id="18" name="TextBox 17">
-            <a:extLst>
-              <a:ext uri="{FF2B5EF4-FFF2-40B4-BE49-F238E27FC236}">
-                <a16:creationId xmlns:a16="http://schemas.microsoft.com/office/drawing/2014/main" id="{0BF6755B-10DB-E4FE-523B-30A3D7A8C323}"/>
+          <p:cNvPr id="19" name="TextBox 18">
+            <a:extLst>
+              <a:ext uri="{FF2B5EF4-FFF2-40B4-BE49-F238E27FC236}">
+                <a16:creationId xmlns:a16="http://schemas.microsoft.com/office/drawing/2014/main" id="{C671B9FB-B10D-5853-FC39-4560C395E64B}"/>
               </a:ext>
             </a:extLst>
           </p:cNvPr>
@@ -3825,8 +3727,8 @@
         </p:nvSpPr>
         <p:spPr>
           <a:xfrm>
-            <a:off x="9916296" y="3064134"/>
-            <a:ext cx="1983259" cy="646331"/>
+            <a:off x="10231247" y="3100861"/>
+            <a:ext cx="1532238" cy="923330"/>
           </a:xfrm>
           <a:prstGeom prst="rect">
             <a:avLst/>
@@ -3841,33 +3743,17 @@
           <a:p>
             <a:r>
               <a:rPr lang="en-US" dirty="0"/>
-              <a:t>Tests per </a:t>
-            </a:r>
-            <a:r>
-              <a:rPr lang="en-US" dirty="0" err="1"/>
-              <a:t>classe</a:t>
-            </a:r>
-            <a:r>
-              <a:rPr lang="en-US" dirty="0"/>
-              <a:t> by </a:t>
-            </a:r>
-            <a:r>
-              <a:rPr lang="en-US" dirty="0" err="1"/>
-              <a:t>package:Ct</a:t>
-            </a:r>
-            <a:r>
-              <a:rPr lang="en-US" dirty="0"/>
-              <a:t>/Cp</a:t>
-            </a:r>
-          </a:p>
-        </p:txBody>
-      </p:sp>
-      <p:sp>
-        <p:nvSpPr>
-          <p:cNvPr id="19" name="TextBox 18">
-            <a:extLst>
-              <a:ext uri="{FF2B5EF4-FFF2-40B4-BE49-F238E27FC236}">
-                <a16:creationId xmlns:a16="http://schemas.microsoft.com/office/drawing/2014/main" id="{C671B9FB-B10D-5853-FC39-4560C395E64B}"/>
+              <a:t>JTA:number of Junit test assertions</a:t>
+            </a:r>
+          </a:p>
+        </p:txBody>
+      </p:sp>
+      <p:sp>
+        <p:nvSpPr>
+          <p:cNvPr id="20" name="TextBox 19">
+            <a:extLst>
+              <a:ext uri="{FF2B5EF4-FFF2-40B4-BE49-F238E27FC236}">
+                <a16:creationId xmlns:a16="http://schemas.microsoft.com/office/drawing/2014/main" id="{E93590C7-7796-FAA7-6907-24C1B8DE2FC2}"/>
               </a:ext>
             </a:extLst>
           </p:cNvPr>
@@ -3876,8 +3762,8 @@
         </p:nvSpPr>
         <p:spPr>
           <a:xfrm>
-            <a:off x="6623223" y="3545362"/>
-            <a:ext cx="1532238" cy="923330"/>
+            <a:off x="3123279" y="2916195"/>
+            <a:ext cx="729049" cy="369332"/>
           </a:xfrm>
           <a:prstGeom prst="rect">
             <a:avLst/>
@@ -3891,22 +3777,18 @@
           <a:lstStyle/>
           <a:p>
             <a:r>
-              <a:rPr lang="en-US" dirty="0" err="1"/>
-              <a:t>JTA:number</a:t>
-            </a:r>
-            <a:r>
               <a:rPr lang="en-US" dirty="0"/>
-              <a:t> of Junit test assertions</a:t>
-            </a:r>
-          </a:p>
-        </p:txBody>
-      </p:sp>
-      <p:sp>
-        <p:nvSpPr>
-          <p:cNvPr id="20" name="TextBox 19">
-            <a:extLst>
-              <a:ext uri="{FF2B5EF4-FFF2-40B4-BE49-F238E27FC236}">
-                <a16:creationId xmlns:a16="http://schemas.microsoft.com/office/drawing/2014/main" id="{E93590C7-7796-FAA7-6907-24C1B8DE2FC2}"/>
+              <a:t>WMC</a:t>
+            </a:r>
+          </a:p>
+        </p:txBody>
+      </p:sp>
+      <p:sp>
+        <p:nvSpPr>
+          <p:cNvPr id="21" name="TextBox 20">
+            <a:extLst>
+              <a:ext uri="{FF2B5EF4-FFF2-40B4-BE49-F238E27FC236}">
+                <a16:creationId xmlns:a16="http://schemas.microsoft.com/office/drawing/2014/main" id="{4DD7DC11-6F9C-40E0-EB0F-B010EC218A58}"/>
               </a:ext>
             </a:extLst>
           </p:cNvPr>
@@ -3915,8 +3797,8 @@
         </p:nvSpPr>
         <p:spPr>
           <a:xfrm>
-            <a:off x="3175685" y="3730028"/>
-            <a:ext cx="729049" cy="369332"/>
+            <a:off x="428515" y="4099360"/>
+            <a:ext cx="1532237" cy="923330"/>
           </a:xfrm>
           <a:prstGeom prst="rect">
             <a:avLst/>
@@ -3931,50 +3813,7 @@
           <a:p>
             <a:r>
               <a:rPr lang="en-US" dirty="0"/>
-              <a:t>WMC</a:t>
-            </a:r>
-          </a:p>
-        </p:txBody>
-      </p:sp>
-      <p:sp>
-        <p:nvSpPr>
-          <p:cNvPr id="21" name="TextBox 20">
-            <a:extLst>
-              <a:ext uri="{FF2B5EF4-FFF2-40B4-BE49-F238E27FC236}">
-                <a16:creationId xmlns:a16="http://schemas.microsoft.com/office/drawing/2014/main" id="{4DD7DC11-6F9C-40E0-EB0F-B010EC218A58}"/>
-              </a:ext>
-            </a:extLst>
-          </p:cNvPr>
-          <p:cNvSpPr txBox="1"/>
-          <p:nvPr/>
-        </p:nvSpPr>
-        <p:spPr>
-          <a:xfrm>
-            <a:off x="827904" y="4099360"/>
-            <a:ext cx="1532237" cy="923330"/>
-          </a:xfrm>
-          <a:prstGeom prst="rect">
-            <a:avLst/>
-          </a:prstGeom>
-          <a:noFill/>
-        </p:spPr>
-        <p:txBody>
-          <a:bodyPr wrap="square" rtlCol="0">
-            <a:spAutoFit/>
-          </a:bodyPr>
-          <a:lstStyle/>
-          <a:p>
-            <a:r>
-              <a:rPr lang="en-US" dirty="0"/>
-              <a:t>Comment </a:t>
-            </a:r>
-            <a:r>
-              <a:rPr lang="en-US" dirty="0" err="1"/>
-              <a:t>Density:CLOC</a:t>
-            </a:r>
-            <a:r>
-              <a:rPr lang="en-US" dirty="0"/>
-              <a:t>/LOC</a:t>
+              <a:t>Comment Density:CLOC/LOC</a:t>
             </a:r>
           </a:p>
         </p:txBody>
@@ -3989,6 +3828,7 @@
             </a:extLst>
           </p:cNvPr>
           <p:cNvCxnSpPr>
+            <a:cxnSpLocks/>
             <a:stCxn id="6" idx="2"/>
             <a:endCxn id="20" idx="0"/>
           </p:cNvCxnSpPr>
@@ -3996,8 +3836,8 @@
         </p:nvCxnSpPr>
         <p:spPr>
           <a:xfrm flipH="1">
-            <a:off x="3540210" y="2307287"/>
-            <a:ext cx="1659925" cy="1422741"/>
+            <a:off x="3487804" y="2307287"/>
+            <a:ext cx="1562063" cy="608908"/>
           </a:xfrm>
           <a:prstGeom prst="straightConnector1">
             <a:avLst/>
@@ -4031,6 +3871,7 @@
             </a:extLst>
           </p:cNvPr>
           <p:cNvCxnSpPr>
+            <a:cxnSpLocks/>
             <a:stCxn id="5" idx="2"/>
             <a:endCxn id="20" idx="0"/>
           </p:cNvCxnSpPr>
@@ -4039,7 +3880,7 @@
         <p:spPr>
           <a:xfrm>
             <a:off x="2174789" y="2307287"/>
-            <a:ext cx="1365421" cy="1422741"/>
+            <a:ext cx="1313015" cy="608908"/>
           </a:xfrm>
           <a:prstGeom prst="straightConnector1">
             <a:avLst/>
@@ -4077,8 +3918,8 @@
         </p:nvSpPr>
         <p:spPr>
           <a:xfrm>
-            <a:off x="4683211" y="3562526"/>
-            <a:ext cx="786713" cy="369332"/>
+            <a:off x="4105255" y="3580538"/>
+            <a:ext cx="647366" cy="369332"/>
           </a:xfrm>
           <a:prstGeom prst="rect">
             <a:avLst/>
@@ -4108,6 +3949,7 @@
             </a:extLst>
           </p:cNvPr>
           <p:cNvCxnSpPr>
+            <a:cxnSpLocks/>
             <a:stCxn id="6" idx="2"/>
             <a:endCxn id="26" idx="0"/>
           </p:cNvCxnSpPr>
@@ -4115,8 +3957,8 @@
         </p:nvCxnSpPr>
         <p:spPr>
           <a:xfrm flipH="1">
-            <a:off x="5076568" y="2307287"/>
-            <a:ext cx="123567" cy="1255239"/>
+            <a:off x="4428938" y="2307287"/>
+            <a:ext cx="620929" cy="1273251"/>
           </a:xfrm>
           <a:prstGeom prst="straightConnector1">
             <a:avLst/>
@@ -4150,6 +3992,7 @@
             </a:extLst>
           </p:cNvPr>
           <p:cNvCxnSpPr>
+            <a:cxnSpLocks/>
             <a:stCxn id="5" idx="2"/>
             <a:endCxn id="21" idx="0"/>
           </p:cNvCxnSpPr>
@@ -4157,8 +4000,8 @@
         </p:nvCxnSpPr>
         <p:spPr>
           <a:xfrm flipH="1">
-            <a:off x="1594023" y="2307287"/>
-            <a:ext cx="580766" cy="1792073"/>
+            <a:off x="1194634" y="2307287"/>
+            <a:ext cx="980155" cy="1792073"/>
           </a:xfrm>
           <a:prstGeom prst="straightConnector1">
             <a:avLst/>
@@ -4192,6 +4035,7 @@
             </a:extLst>
           </p:cNvPr>
           <p:cNvCxnSpPr>
+            <a:cxnSpLocks/>
             <a:stCxn id="5" idx="2"/>
             <a:endCxn id="17" idx="0"/>
           </p:cNvCxnSpPr>
@@ -4200,7 +4044,7 @@
         <p:spPr>
           <a:xfrm>
             <a:off x="2174789" y="2307287"/>
-            <a:ext cx="420129" cy="885907"/>
+            <a:ext cx="20740" cy="885907"/>
           </a:xfrm>
           <a:prstGeom prst="straightConnector1">
             <a:avLst/>
@@ -4234,15 +4078,258 @@
             </a:extLst>
           </p:cNvPr>
           <p:cNvCxnSpPr>
-            <a:stCxn id="7" idx="2"/>
+            <a:cxnSpLocks/>
+            <a:stCxn id="8" idx="2"/>
             <a:endCxn id="19" idx="0"/>
           </p:cNvCxnSpPr>
           <p:nvPr/>
         </p:nvCxnSpPr>
         <p:spPr>
           <a:xfrm>
-            <a:off x="7309021" y="2168787"/>
-            <a:ext cx="80321" cy="1376575"/>
+            <a:off x="10144897" y="2307287"/>
+            <a:ext cx="852469" cy="793574"/>
+          </a:xfrm>
+          <a:prstGeom prst="straightConnector1">
+            <a:avLst/>
+          </a:prstGeom>
+          <a:ln w="31750">
+            <a:tailEnd type="triangle"/>
+          </a:ln>
+        </p:spPr>
+        <p:style>
+          <a:lnRef idx="1">
+            <a:schemeClr val="accent1"/>
+          </a:lnRef>
+          <a:fillRef idx="0">
+            <a:schemeClr val="accent1"/>
+          </a:fillRef>
+          <a:effectRef idx="0">
+            <a:schemeClr val="accent1"/>
+          </a:effectRef>
+          <a:fontRef idx="minor">
+            <a:schemeClr val="tx1"/>
+          </a:fontRef>
+        </p:style>
+      </p:cxnSp>
+      <p:sp>
+        <p:nvSpPr>
+          <p:cNvPr id="37" name="TextBox 36">
+            <a:extLst>
+              <a:ext uri="{FF2B5EF4-FFF2-40B4-BE49-F238E27FC236}">
+                <a16:creationId xmlns:a16="http://schemas.microsoft.com/office/drawing/2014/main" id="{1730D25F-9A0D-06B3-90D8-C34EA8F74E3B}"/>
+              </a:ext>
+            </a:extLst>
+          </p:cNvPr>
+          <p:cNvSpPr txBox="1"/>
+          <p:nvPr/>
+        </p:nvSpPr>
+        <p:spPr>
+          <a:xfrm>
+            <a:off x="5022210" y="3524442"/>
+            <a:ext cx="784363" cy="369332"/>
+          </a:xfrm>
+          <a:prstGeom prst="rect">
+            <a:avLst/>
+          </a:prstGeom>
+          <a:noFill/>
+        </p:spPr>
+        <p:txBody>
+          <a:bodyPr wrap="square" rtlCol="0">
+            <a:spAutoFit/>
+          </a:bodyPr>
+          <a:lstStyle/>
+          <a:p>
+            <a:r>
+              <a:rPr lang="en-US" dirty="0"/>
+              <a:t>LCOM</a:t>
+            </a:r>
+          </a:p>
+        </p:txBody>
+      </p:sp>
+      <p:cxnSp>
+        <p:nvCxnSpPr>
+          <p:cNvPr id="39" name="Straight Arrow Connector 38">
+            <a:extLst>
+              <a:ext uri="{FF2B5EF4-FFF2-40B4-BE49-F238E27FC236}">
+                <a16:creationId xmlns:a16="http://schemas.microsoft.com/office/drawing/2014/main" id="{62BE97C2-8303-5315-2257-25D0043525D3}"/>
+              </a:ext>
+            </a:extLst>
+          </p:cNvPr>
+          <p:cNvCxnSpPr>
+            <a:cxnSpLocks/>
+            <a:stCxn id="6" idx="2"/>
+            <a:endCxn id="37" idx="0"/>
+          </p:cNvCxnSpPr>
+          <p:nvPr/>
+        </p:nvCxnSpPr>
+        <p:spPr>
+          <a:xfrm>
+            <a:off x="5049867" y="2307287"/>
+            <a:ext cx="364525" cy="1217155"/>
+          </a:xfrm>
+          <a:prstGeom prst="straightConnector1">
+            <a:avLst/>
+          </a:prstGeom>
+          <a:ln w="31750">
+            <a:tailEnd type="triangle"/>
+          </a:ln>
+        </p:spPr>
+        <p:style>
+          <a:lnRef idx="1">
+            <a:schemeClr val="accent1"/>
+          </a:lnRef>
+          <a:fillRef idx="0">
+            <a:schemeClr val="accent1"/>
+          </a:fillRef>
+          <a:effectRef idx="0">
+            <a:schemeClr val="accent1"/>
+          </a:effectRef>
+          <a:fontRef idx="minor">
+            <a:schemeClr val="tx1"/>
+          </a:fontRef>
+        </p:style>
+      </p:cxnSp>
+      <p:sp>
+        <p:nvSpPr>
+          <p:cNvPr id="2" name="TextBox 1">
+            <a:extLst>
+              <a:ext uri="{FF2B5EF4-FFF2-40B4-BE49-F238E27FC236}">
+                <a16:creationId xmlns:a16="http://schemas.microsoft.com/office/drawing/2014/main" id="{9BABC095-E70C-C911-94C8-1DE0DE963E53}"/>
+              </a:ext>
+            </a:extLst>
+          </p:cNvPr>
+          <p:cNvSpPr txBox="1"/>
+          <p:nvPr/>
+        </p:nvSpPr>
+        <p:spPr>
+          <a:xfrm>
+            <a:off x="8004015" y="3285527"/>
+            <a:ext cx="1532238" cy="923330"/>
+          </a:xfrm>
+          <a:prstGeom prst="rect">
+            <a:avLst/>
+          </a:prstGeom>
+          <a:noFill/>
+        </p:spPr>
+        <p:txBody>
+          <a:bodyPr wrap="square" rtlCol="0">
+            <a:spAutoFit/>
+          </a:bodyPr>
+          <a:lstStyle/>
+          <a:p>
+            <a:r>
+              <a:rPr lang="en-US" dirty="0"/>
+              <a:t>JTC:number of JUnit test cases</a:t>
+            </a:r>
+          </a:p>
+        </p:txBody>
+      </p:sp>
+      <p:cxnSp>
+        <p:nvCxnSpPr>
+          <p:cNvPr id="13" name="Straight Arrow Connector 12">
+            <a:extLst>
+              <a:ext uri="{FF2B5EF4-FFF2-40B4-BE49-F238E27FC236}">
+                <a16:creationId xmlns:a16="http://schemas.microsoft.com/office/drawing/2014/main" id="{DC5A8EF8-4BBF-63C6-E777-D7A4D0230F65}"/>
+              </a:ext>
+            </a:extLst>
+          </p:cNvPr>
+          <p:cNvCxnSpPr>
+            <a:cxnSpLocks/>
+            <a:stCxn id="8" idx="2"/>
+            <a:endCxn id="2" idx="0"/>
+          </p:cNvCxnSpPr>
+          <p:nvPr/>
+        </p:nvCxnSpPr>
+        <p:spPr>
+          <a:xfrm flipH="1">
+            <a:off x="8770134" y="2307287"/>
+            <a:ext cx="1374763" cy="978240"/>
+          </a:xfrm>
+          <a:prstGeom prst="straightConnector1">
+            <a:avLst/>
+          </a:prstGeom>
+          <a:ln w="31750">
+            <a:tailEnd type="triangle"/>
+          </a:ln>
+        </p:spPr>
+        <p:style>
+          <a:lnRef idx="1">
+            <a:schemeClr val="accent1"/>
+          </a:lnRef>
+          <a:fillRef idx="0">
+            <a:schemeClr val="accent1"/>
+          </a:fillRef>
+          <a:effectRef idx="0">
+            <a:schemeClr val="accent1"/>
+          </a:effectRef>
+          <a:fontRef idx="minor">
+            <a:schemeClr val="tx1"/>
+          </a:fontRef>
+        </p:style>
+      </p:cxnSp>
+      <p:sp>
+        <p:nvSpPr>
+          <p:cNvPr id="41" name="TextBox 40">
+            <a:extLst>
+              <a:ext uri="{FF2B5EF4-FFF2-40B4-BE49-F238E27FC236}">
+                <a16:creationId xmlns:a16="http://schemas.microsoft.com/office/drawing/2014/main" id="{DC717E4B-F78E-682C-55B7-3A79E8263304}"/>
+              </a:ext>
+            </a:extLst>
+          </p:cNvPr>
+          <p:cNvSpPr txBox="1"/>
+          <p:nvPr/>
+        </p:nvSpPr>
+        <p:spPr>
+          <a:xfrm>
+            <a:off x="6314303" y="3247443"/>
+            <a:ext cx="1532238" cy="923330"/>
+          </a:xfrm>
+          <a:prstGeom prst="rect">
+            <a:avLst/>
+          </a:prstGeom>
+          <a:noFill/>
+        </p:spPr>
+        <p:txBody>
+          <a:bodyPr wrap="square" rtlCol="0">
+            <a:spAutoFit/>
+          </a:bodyPr>
+          <a:lstStyle/>
+          <a:p>
+            <a:r>
+              <a:rPr lang="en-US" dirty="0"/>
+              <a:t>Instability</a:t>
+            </a:r>
+            <a:r>
+              <a:rPr lang="en-CA" dirty="0"/>
+              <a:t>:</a:t>
+            </a:r>
+            <a:r>
+              <a:rPr lang="en-US" dirty="0"/>
+              <a:t> range of [0,1]. Ce/(Ca+Ce)</a:t>
+            </a:r>
+          </a:p>
+        </p:txBody>
+      </p:sp>
+      <p:cxnSp>
+        <p:nvCxnSpPr>
+          <p:cNvPr id="42" name="Straight Arrow Connector 41">
+            <a:extLst>
+              <a:ext uri="{FF2B5EF4-FFF2-40B4-BE49-F238E27FC236}">
+                <a16:creationId xmlns:a16="http://schemas.microsoft.com/office/drawing/2014/main" id="{A7A4045D-5C7F-0B54-94F8-BBB971D87690}"/>
+              </a:ext>
+            </a:extLst>
+          </p:cNvPr>
+          <p:cNvCxnSpPr>
+            <a:cxnSpLocks/>
+            <a:stCxn id="7" idx="2"/>
+            <a:endCxn id="41" idx="0"/>
+          </p:cNvCxnSpPr>
+          <p:nvPr/>
+        </p:nvCxnSpPr>
+        <p:spPr>
+          <a:xfrm flipH="1">
+            <a:off x="7080422" y="2168787"/>
+            <a:ext cx="228599" cy="1078656"/>
           </a:xfrm>
           <a:prstGeom prst="straightConnector1">
             <a:avLst/>
@@ -4268,24 +4355,24 @@
       </p:cxnSp>
       <p:cxnSp>
         <p:nvCxnSpPr>
-          <p:cNvPr id="36" name="Straight Arrow Connector 35">
-            <a:extLst>
-              <a:ext uri="{FF2B5EF4-FFF2-40B4-BE49-F238E27FC236}">
-                <a16:creationId xmlns:a16="http://schemas.microsoft.com/office/drawing/2014/main" id="{63829219-2E63-258C-6C92-70383EF771FF}"/>
+          <p:cNvPr id="48" name="Straight Arrow Connector 47">
+            <a:extLst>
+              <a:ext uri="{FF2B5EF4-FFF2-40B4-BE49-F238E27FC236}">
+                <a16:creationId xmlns:a16="http://schemas.microsoft.com/office/drawing/2014/main" id="{1A031F0C-B445-32E3-DC59-130FA9ED560E}"/>
               </a:ext>
             </a:extLst>
           </p:cNvPr>
           <p:cNvCxnSpPr>
             <a:cxnSpLocks/>
-            <a:stCxn id="8" idx="2"/>
-            <a:endCxn id="18" idx="0"/>
+            <a:stCxn id="7" idx="2"/>
+            <a:endCxn id="2" idx="0"/>
           </p:cNvCxnSpPr>
           <p:nvPr/>
         </p:nvCxnSpPr>
         <p:spPr>
           <a:xfrm>
-            <a:off x="10144897" y="2307287"/>
-            <a:ext cx="763029" cy="756847"/>
+            <a:off x="7309021" y="2168787"/>
+            <a:ext cx="1461113" cy="1116740"/>
           </a:xfrm>
           <a:prstGeom prst="straightConnector1">
             <a:avLst/>
@@ -4311,10 +4398,10 @@
       </p:cxnSp>
       <p:sp>
         <p:nvSpPr>
-          <p:cNvPr id="37" name="TextBox 36">
-            <a:extLst>
-              <a:ext uri="{FF2B5EF4-FFF2-40B4-BE49-F238E27FC236}">
-                <a16:creationId xmlns:a16="http://schemas.microsoft.com/office/drawing/2014/main" id="{1730D25F-9A0D-06B3-90D8-C34EA8F74E3B}"/>
+          <p:cNvPr id="52" name="TextBox 51">
+            <a:extLst>
+              <a:ext uri="{FF2B5EF4-FFF2-40B4-BE49-F238E27FC236}">
+                <a16:creationId xmlns:a16="http://schemas.microsoft.com/office/drawing/2014/main" id="{C1FEB23B-3427-A831-6EED-306A6F9BAED5}"/>
               </a:ext>
             </a:extLst>
           </p:cNvPr>
@@ -4323,8 +4410,8 @@
         </p:nvSpPr>
         <p:spPr>
           <a:xfrm>
-            <a:off x="5469924" y="4099360"/>
-            <a:ext cx="1140940" cy="369332"/>
+            <a:off x="3989172" y="5077600"/>
+            <a:ext cx="1750541" cy="646331"/>
           </a:xfrm>
           <a:prstGeom prst="rect">
             <a:avLst/>
@@ -4332,37 +4419,81 @@
           <a:noFill/>
         </p:spPr>
         <p:txBody>
-          <a:bodyPr wrap="square" rtlCol="0">
+          <a:bodyPr wrap="square">
             <a:spAutoFit/>
           </a:bodyPr>
           <a:lstStyle/>
           <a:p>
             <a:r>
               <a:rPr lang="en-US" dirty="0"/>
-              <a:t>LCOM</a:t>
+              <a:t>v(G): Cyclomatic complexity</a:t>
             </a:r>
           </a:p>
         </p:txBody>
       </p:sp>
       <p:cxnSp>
         <p:nvCxnSpPr>
-          <p:cNvPr id="39" name="Straight Arrow Connector 38">
-            <a:extLst>
-              <a:ext uri="{FF2B5EF4-FFF2-40B4-BE49-F238E27FC236}">
-                <a16:creationId xmlns:a16="http://schemas.microsoft.com/office/drawing/2014/main" id="{62BE97C2-8303-5315-2257-25D0043525D3}"/>
+          <p:cNvPr id="59" name="Straight Arrow Connector 58">
+            <a:extLst>
+              <a:ext uri="{FF2B5EF4-FFF2-40B4-BE49-F238E27FC236}">
+                <a16:creationId xmlns:a16="http://schemas.microsoft.com/office/drawing/2014/main" id="{EE0133F3-29AD-1597-1469-D5131105E5BC}"/>
               </a:ext>
             </a:extLst>
           </p:cNvPr>
           <p:cNvCxnSpPr>
-            <a:stCxn id="6" idx="2"/>
-            <a:endCxn id="37" idx="0"/>
+            <a:cxnSpLocks/>
+            <a:stCxn id="7" idx="2"/>
+            <a:endCxn id="52" idx="0"/>
           </p:cNvCxnSpPr>
           <p:nvPr/>
         </p:nvCxnSpPr>
         <p:spPr>
+          <a:xfrm flipH="1">
+            <a:off x="4864443" y="2168787"/>
+            <a:ext cx="2444578" cy="2908813"/>
+          </a:xfrm>
+          <a:prstGeom prst="straightConnector1">
+            <a:avLst/>
+          </a:prstGeom>
+          <a:ln w="31750">
+            <a:tailEnd type="triangle"/>
+          </a:ln>
+        </p:spPr>
+        <p:style>
+          <a:lnRef idx="1">
+            <a:schemeClr val="accent1"/>
+          </a:lnRef>
+          <a:fillRef idx="0">
+            <a:schemeClr val="accent1"/>
+          </a:fillRef>
+          <a:effectRef idx="0">
+            <a:schemeClr val="accent1"/>
+          </a:effectRef>
+          <a:fontRef idx="minor">
+            <a:schemeClr val="tx1"/>
+          </a:fontRef>
+        </p:style>
+      </p:cxnSp>
+      <p:cxnSp>
+        <p:nvCxnSpPr>
+          <p:cNvPr id="62" name="Straight Arrow Connector 61">
+            <a:extLst>
+              <a:ext uri="{FF2B5EF4-FFF2-40B4-BE49-F238E27FC236}">
+                <a16:creationId xmlns:a16="http://schemas.microsoft.com/office/drawing/2014/main" id="{63833FBA-CF6D-12A1-1E94-E18405EC3C37}"/>
+              </a:ext>
+            </a:extLst>
+          </p:cNvPr>
+          <p:cNvCxnSpPr>
+            <a:cxnSpLocks/>
+            <a:stCxn id="5" idx="2"/>
+            <a:endCxn id="52" idx="0"/>
+          </p:cNvCxnSpPr>
+          <p:nvPr/>
+        </p:nvCxnSpPr>
+        <p:spPr>
           <a:xfrm>
-            <a:off x="5200135" y="2307287"/>
-            <a:ext cx="840259" cy="1792073"/>
+            <a:off x="2174789" y="2307287"/>
+            <a:ext cx="2689654" cy="2770313"/>
           </a:xfrm>
           <a:prstGeom prst="straightConnector1">
             <a:avLst/>

</xml_diff>

<commit_message>
update GQM plan manping's version
</commit_message>
<xml_diff>
--- a/devoir2/WenhaoXU_20150702_ManpingLI_968527/GQM plan.pptx
+++ b/devoir2/WenhaoXU_20150702_ManpingLI_968527/GQM plan.pptx
@@ -115,9 +115,206 @@
 <file path=ppt/revisionInfo.xml><?xml version="1.0" encoding="utf-8"?>
 <p1510:revInfo xmlns:a="http://schemas.openxmlformats.org/drawingml/2006/main" xmlns:r="http://schemas.openxmlformats.org/officeDocument/2006/relationships" xmlns:p1510="http://schemas.microsoft.com/office/powerpoint/2015/10/main">
   <p1510:revLst>
-    <p1510:client id="{F69B6B5C-DB74-1B41-A67C-3F51A2451015}" v="8" dt="2022-10-20T03:11:35.379"/>
+    <p1510:client id="{F69B6B5C-DB74-1B41-A67C-3F51A2451015}" v="10" dt="2022-10-21T19:17:35.713"/>
   </p1510:revLst>
 </p1510:revInfo>
+</file>
+
+<file path=ppt/changesInfos/changesInfo1.xml><?xml version="1.0" encoding="utf-8"?>
+<pc:chgInfo xmlns:a="http://schemas.openxmlformats.org/drawingml/2006/main" xmlns:r="http://schemas.openxmlformats.org/officeDocument/2006/relationships" xmlns:ac="http://schemas.microsoft.com/office/drawing/2013/main/command" xmlns:pc="http://schemas.microsoft.com/office/powerpoint/2013/main/command">
+  <pc:docChgLst>
+    <pc:chgData name="Man Ping LI" userId="9a296d72e9c16694" providerId="LiveId" clId="{F69B6B5C-DB74-1B41-A67C-3F51A2451015}"/>
+    <pc:docChg chg="custSel modSld">
+      <pc:chgData name="Man Ping LI" userId="9a296d72e9c16694" providerId="LiveId" clId="{F69B6B5C-DB74-1B41-A67C-3F51A2451015}" dt="2022-10-21T19:19:01.246" v="33" actId="692"/>
+      <pc:docMkLst>
+        <pc:docMk/>
+      </pc:docMkLst>
+      <pc:sldChg chg="addSp delSp modSp mod">
+        <pc:chgData name="Man Ping LI" userId="9a296d72e9c16694" providerId="LiveId" clId="{F69B6B5C-DB74-1B41-A67C-3F51A2451015}" dt="2022-10-21T19:19:01.246" v="33" actId="692"/>
+        <pc:sldMkLst>
+          <pc:docMk/>
+          <pc:sldMk cId="1972806892" sldId="256"/>
+        </pc:sldMkLst>
+        <pc:spChg chg="mod">
+          <ac:chgData name="Man Ping LI" userId="9a296d72e9c16694" providerId="LiveId" clId="{F69B6B5C-DB74-1B41-A67C-3F51A2451015}" dt="2022-10-21T19:16:38.733" v="10" actId="1076"/>
+          <ac:spMkLst>
+            <pc:docMk/>
+            <pc:sldMk cId="1972806892" sldId="256"/>
+            <ac:spMk id="2" creationId="{9BABC095-E70C-C911-94C8-1DE0DE963E53}"/>
+          </ac:spMkLst>
+        </pc:spChg>
+        <pc:spChg chg="del">
+          <ac:chgData name="Man Ping LI" userId="9a296d72e9c16694" providerId="LiveId" clId="{F69B6B5C-DB74-1B41-A67C-3F51A2451015}" dt="2022-10-21T19:17:28.042" v="18" actId="478"/>
+          <ac:spMkLst>
+            <pc:docMk/>
+            <pc:sldMk cId="1972806892" sldId="256"/>
+            <ac:spMk id="19" creationId="{C671B9FB-B10D-5853-FC39-4560C395E64B}"/>
+          </ac:spMkLst>
+        </pc:spChg>
+        <pc:spChg chg="mod">
+          <ac:chgData name="Man Ping LI" userId="9a296d72e9c16694" providerId="LiveId" clId="{F69B6B5C-DB74-1B41-A67C-3F51A2451015}" dt="2022-10-21T19:18:19.842" v="27" actId="1076"/>
+          <ac:spMkLst>
+            <pc:docMk/>
+            <pc:sldMk cId="1972806892" sldId="256"/>
+            <ac:spMk id="26" creationId="{5E42ABF8-E29C-867B-01C6-69E7A43A1E14}"/>
+          </ac:spMkLst>
+        </pc:spChg>
+        <pc:spChg chg="add mod">
+          <ac:chgData name="Man Ping LI" userId="9a296d72e9c16694" providerId="LiveId" clId="{F69B6B5C-DB74-1B41-A67C-3F51A2451015}" dt="2022-10-21T19:16:59.537" v="15" actId="1076"/>
+          <ac:spMkLst>
+            <pc:docMk/>
+            <pc:sldMk cId="1972806892" sldId="256"/>
+            <ac:spMk id="31" creationId="{F2043878-2F25-134B-9F3B-674B90D038B6}"/>
+          </ac:spMkLst>
+        </pc:spChg>
+        <pc:spChg chg="mod">
+          <ac:chgData name="Man Ping LI" userId="9a296d72e9c16694" providerId="LiveId" clId="{F69B6B5C-DB74-1B41-A67C-3F51A2451015}" dt="2022-10-21T19:16:05.240" v="3" actId="1076"/>
+          <ac:spMkLst>
+            <pc:docMk/>
+            <pc:sldMk cId="1972806892" sldId="256"/>
+            <ac:spMk id="37" creationId="{1730D25F-9A0D-06B3-90D8-C34EA8F74E3B}"/>
+          </ac:spMkLst>
+        </pc:spChg>
+        <pc:spChg chg="add mod">
+          <ac:chgData name="Man Ping LI" userId="9a296d72e9c16694" providerId="LiveId" clId="{F69B6B5C-DB74-1B41-A67C-3F51A2451015}" dt="2022-10-21T19:18:16.661" v="26" actId="1076"/>
+          <ac:spMkLst>
+            <pc:docMk/>
+            <pc:sldMk cId="1972806892" sldId="256"/>
+            <ac:spMk id="40" creationId="{035A5DDB-34B8-D20D-C9CA-2663EF09E8DE}"/>
+          </ac:spMkLst>
+        </pc:spChg>
+        <pc:spChg chg="del">
+          <ac:chgData name="Man Ping LI" userId="9a296d72e9c16694" providerId="LiveId" clId="{F69B6B5C-DB74-1B41-A67C-3F51A2451015}" dt="2022-10-21T19:16:26.459" v="6" actId="478"/>
+          <ac:spMkLst>
+            <pc:docMk/>
+            <pc:sldMk cId="1972806892" sldId="256"/>
+            <ac:spMk id="41" creationId="{DC717E4B-F78E-682C-55B7-3A79E8263304}"/>
+          </ac:spMkLst>
+        </pc:spChg>
+        <pc:spChg chg="mod">
+          <ac:chgData name="Man Ping LI" userId="9a296d72e9c16694" providerId="LiveId" clId="{F69B6B5C-DB74-1B41-A67C-3F51A2451015}" dt="2022-10-21T19:15:47.868" v="0" actId="1076"/>
+          <ac:spMkLst>
+            <pc:docMk/>
+            <pc:sldMk cId="1972806892" sldId="256"/>
+            <ac:spMk id="52" creationId="{C1FEB23B-3427-A831-6EED-306A6F9BAED5}"/>
+          </ac:spMkLst>
+        </pc:spChg>
+        <pc:cxnChg chg="del mod">
+          <ac:chgData name="Man Ping LI" userId="9a296d72e9c16694" providerId="LiveId" clId="{F69B6B5C-DB74-1B41-A67C-3F51A2451015}" dt="2022-10-21T19:16:35.954" v="9" actId="478"/>
+          <ac:cxnSpMkLst>
+            <pc:docMk/>
+            <pc:sldMk cId="1972806892" sldId="256"/>
+            <ac:cxnSpMk id="13" creationId="{DC5A8EF8-4BBF-63C6-E777-D7A4D0230F65}"/>
+          </ac:cxnSpMkLst>
+        </pc:cxnChg>
+        <pc:cxnChg chg="add mod">
+          <ac:chgData name="Man Ping LI" userId="9a296d72e9c16694" providerId="LiveId" clId="{F69B6B5C-DB74-1B41-A67C-3F51A2451015}" dt="2022-10-21T19:16:19.503" v="5" actId="692"/>
+          <ac:cxnSpMkLst>
+            <pc:docMk/>
+            <pc:sldMk cId="1972806892" sldId="256"/>
+            <ac:cxnSpMk id="22" creationId="{C7AB4BC3-6003-6DE0-34F4-81420AD4F5DC}"/>
+          </ac:cxnSpMkLst>
+        </pc:cxnChg>
+        <pc:cxnChg chg="mod">
+          <ac:chgData name="Man Ping LI" userId="9a296d72e9c16694" providerId="LiveId" clId="{F69B6B5C-DB74-1B41-A67C-3F51A2451015}" dt="2022-10-21T19:18:19.842" v="27" actId="1076"/>
+          <ac:cxnSpMkLst>
+            <pc:docMk/>
+            <pc:sldMk cId="1972806892" sldId="256"/>
+            <ac:cxnSpMk id="28" creationId="{EC3F9BFE-3A38-1844-6D72-421D5403A1B3}"/>
+          </ac:cxnSpMkLst>
+        </pc:cxnChg>
+        <pc:cxnChg chg="del mod">
+          <ac:chgData name="Man Ping LI" userId="9a296d72e9c16694" providerId="LiveId" clId="{F69B6B5C-DB74-1B41-A67C-3F51A2451015}" dt="2022-10-21T19:17:30.053" v="19" actId="478"/>
+          <ac:cxnSpMkLst>
+            <pc:docMk/>
+            <pc:sldMk cId="1972806892" sldId="256"/>
+            <ac:cxnSpMk id="34" creationId="{55FB8443-B16F-B6BF-711E-A2BA778EAD97}"/>
+          </ac:cxnSpMkLst>
+        </pc:cxnChg>
+        <pc:cxnChg chg="add mod">
+          <ac:chgData name="Man Ping LI" userId="9a296d72e9c16694" providerId="LiveId" clId="{F69B6B5C-DB74-1B41-A67C-3F51A2451015}" dt="2022-10-21T19:19:01.246" v="33" actId="692"/>
+          <ac:cxnSpMkLst>
+            <pc:docMk/>
+            <pc:sldMk cId="1972806892" sldId="256"/>
+            <ac:cxnSpMk id="35" creationId="{25C28540-545C-B7D6-FFFC-BDE3967FB0B6}"/>
+          </ac:cxnSpMkLst>
+        </pc:cxnChg>
+        <pc:cxnChg chg="add mod">
+          <ac:chgData name="Man Ping LI" userId="9a296d72e9c16694" providerId="LiveId" clId="{F69B6B5C-DB74-1B41-A67C-3F51A2451015}" dt="2022-10-21T19:18:56.596" v="32" actId="692"/>
+          <ac:cxnSpMkLst>
+            <pc:docMk/>
+            <pc:sldMk cId="1972806892" sldId="256"/>
+            <ac:cxnSpMk id="38" creationId="{FE9BF910-F7B0-5DA0-201C-1B4E4298E8F1}"/>
+          </ac:cxnSpMkLst>
+        </pc:cxnChg>
+        <pc:cxnChg chg="mod">
+          <ac:chgData name="Man Ping LI" userId="9a296d72e9c16694" providerId="LiveId" clId="{F69B6B5C-DB74-1B41-A67C-3F51A2451015}" dt="2022-10-21T19:16:05.240" v="3" actId="1076"/>
+          <ac:cxnSpMkLst>
+            <pc:docMk/>
+            <pc:sldMk cId="1972806892" sldId="256"/>
+            <ac:cxnSpMk id="39" creationId="{62BE97C2-8303-5315-2257-25D0043525D3}"/>
+          </ac:cxnSpMkLst>
+        </pc:cxnChg>
+        <pc:cxnChg chg="del mod">
+          <ac:chgData name="Man Ping LI" userId="9a296d72e9c16694" providerId="LiveId" clId="{F69B6B5C-DB74-1B41-A67C-3F51A2451015}" dt="2022-10-21T19:16:27.921" v="7" actId="478"/>
+          <ac:cxnSpMkLst>
+            <pc:docMk/>
+            <pc:sldMk cId="1972806892" sldId="256"/>
+            <ac:cxnSpMk id="42" creationId="{A7A4045D-5C7F-0B54-94F8-BBB971D87690}"/>
+          </ac:cxnSpMkLst>
+        </pc:cxnChg>
+        <pc:cxnChg chg="add mod">
+          <ac:chgData name="Man Ping LI" userId="9a296d72e9c16694" providerId="LiveId" clId="{F69B6B5C-DB74-1B41-A67C-3F51A2451015}" dt="2022-10-21T19:18:47.595" v="30" actId="692"/>
+          <ac:cxnSpMkLst>
+            <pc:docMk/>
+            <pc:sldMk cId="1972806892" sldId="256"/>
+            <ac:cxnSpMk id="44" creationId="{FFCEC94D-43C6-9CEB-54C2-A3CC36EAE832}"/>
+          </ac:cxnSpMkLst>
+        </pc:cxnChg>
+        <pc:cxnChg chg="add mod">
+          <ac:chgData name="Man Ping LI" userId="9a296d72e9c16694" providerId="LiveId" clId="{F69B6B5C-DB74-1B41-A67C-3F51A2451015}" dt="2022-10-21T19:18:43.095" v="29" actId="692"/>
+          <ac:cxnSpMkLst>
+            <pc:docMk/>
+            <pc:sldMk cId="1972806892" sldId="256"/>
+            <ac:cxnSpMk id="46" creationId="{6B00420F-7C2C-89F2-70E3-3441A22A73B0}"/>
+          </ac:cxnSpMkLst>
+        </pc:cxnChg>
+        <pc:cxnChg chg="mod">
+          <ac:chgData name="Man Ping LI" userId="9a296d72e9c16694" providerId="LiveId" clId="{F69B6B5C-DB74-1B41-A67C-3F51A2451015}" dt="2022-10-21T19:16:38.733" v="10" actId="1076"/>
+          <ac:cxnSpMkLst>
+            <pc:docMk/>
+            <pc:sldMk cId="1972806892" sldId="256"/>
+            <ac:cxnSpMk id="48" creationId="{1A031F0C-B445-32E3-DC59-130FA9ED560E}"/>
+          </ac:cxnSpMkLst>
+        </pc:cxnChg>
+        <pc:cxnChg chg="add mod">
+          <ac:chgData name="Man Ping LI" userId="9a296d72e9c16694" providerId="LiveId" clId="{F69B6B5C-DB74-1B41-A67C-3F51A2451015}" dt="2022-10-21T19:18:51.712" v="31" actId="692"/>
+          <ac:cxnSpMkLst>
+            <pc:docMk/>
+            <pc:sldMk cId="1972806892" sldId="256"/>
+            <ac:cxnSpMk id="53" creationId="{82365185-0A29-35BD-8AD6-CB5C90CB14C9}"/>
+          </ac:cxnSpMkLst>
+        </pc:cxnChg>
+        <pc:cxnChg chg="del mod">
+          <ac:chgData name="Man Ping LI" userId="9a296d72e9c16694" providerId="LiveId" clId="{F69B6B5C-DB74-1B41-A67C-3F51A2451015}" dt="2022-10-21T19:15:49.043" v="1" actId="478"/>
+          <ac:cxnSpMkLst>
+            <pc:docMk/>
+            <pc:sldMk cId="1972806892" sldId="256"/>
+            <ac:cxnSpMk id="59" creationId="{EE0133F3-29AD-1597-1469-D5131105E5BC}"/>
+          </ac:cxnSpMkLst>
+        </pc:cxnChg>
+        <pc:cxnChg chg="mod">
+          <ac:chgData name="Man Ping LI" userId="9a296d72e9c16694" providerId="LiveId" clId="{F69B6B5C-DB74-1B41-A67C-3F51A2451015}" dt="2022-10-21T19:15:47.868" v="0" actId="1076"/>
+          <ac:cxnSpMkLst>
+            <pc:docMk/>
+            <pc:sldMk cId="1972806892" sldId="256"/>
+            <ac:cxnSpMk id="62" creationId="{63833FBA-CF6D-12A1-1E94-E18405EC3C37}"/>
+          </ac:cxnSpMkLst>
+        </pc:cxnChg>
+      </pc:sldChg>
+    </pc:docChg>
+  </pc:docChgLst>
+</pc:chgInfo>
 </file>
 
 <file path=ppt/slideLayouts/slideLayout1.xml><?xml version="1.0" encoding="utf-8"?>
@@ -267,7 +464,7 @@
           <a:p>
             <a:fld id="{6D0E7609-1A7C-1E43-81AD-3B15F6EC7206}" type="datetimeFigureOut">
               <a:rPr lang="en-US" smtClean="0"/>
-              <a:t>10/20/22</a:t>
+              <a:t>10/21/22</a:t>
             </a:fld>
             <a:endParaRPr lang="en-US"/>
           </a:p>
@@ -465,7 +662,7 @@
           <a:p>
             <a:fld id="{6D0E7609-1A7C-1E43-81AD-3B15F6EC7206}" type="datetimeFigureOut">
               <a:rPr lang="en-US" smtClean="0"/>
-              <a:t>10/20/22</a:t>
+              <a:t>10/21/22</a:t>
             </a:fld>
             <a:endParaRPr lang="en-US"/>
           </a:p>
@@ -673,7 +870,7 @@
           <a:p>
             <a:fld id="{6D0E7609-1A7C-1E43-81AD-3B15F6EC7206}" type="datetimeFigureOut">
               <a:rPr lang="en-US" smtClean="0"/>
-              <a:t>10/20/22</a:t>
+              <a:t>10/21/22</a:t>
             </a:fld>
             <a:endParaRPr lang="en-US"/>
           </a:p>
@@ -871,7 +1068,7 @@
           <a:p>
             <a:fld id="{6D0E7609-1A7C-1E43-81AD-3B15F6EC7206}" type="datetimeFigureOut">
               <a:rPr lang="en-US" smtClean="0"/>
-              <a:t>10/20/22</a:t>
+              <a:t>10/21/22</a:t>
             </a:fld>
             <a:endParaRPr lang="en-US"/>
           </a:p>
@@ -1146,7 +1343,7 @@
           <a:p>
             <a:fld id="{6D0E7609-1A7C-1E43-81AD-3B15F6EC7206}" type="datetimeFigureOut">
               <a:rPr lang="en-US" smtClean="0"/>
-              <a:t>10/20/22</a:t>
+              <a:t>10/21/22</a:t>
             </a:fld>
             <a:endParaRPr lang="en-US"/>
           </a:p>
@@ -1411,7 +1608,7 @@
           <a:p>
             <a:fld id="{6D0E7609-1A7C-1E43-81AD-3B15F6EC7206}" type="datetimeFigureOut">
               <a:rPr lang="en-US" smtClean="0"/>
-              <a:t>10/20/22</a:t>
+              <a:t>10/21/22</a:t>
             </a:fld>
             <a:endParaRPr lang="en-US"/>
           </a:p>
@@ -1823,7 +2020,7 @@
           <a:p>
             <a:fld id="{6D0E7609-1A7C-1E43-81AD-3B15F6EC7206}" type="datetimeFigureOut">
               <a:rPr lang="en-US" smtClean="0"/>
-              <a:t>10/20/22</a:t>
+              <a:t>10/21/22</a:t>
             </a:fld>
             <a:endParaRPr lang="en-US"/>
           </a:p>
@@ -1964,7 +2161,7 @@
           <a:p>
             <a:fld id="{6D0E7609-1A7C-1E43-81AD-3B15F6EC7206}" type="datetimeFigureOut">
               <a:rPr lang="en-US" smtClean="0"/>
-              <a:t>10/20/22</a:t>
+              <a:t>10/21/22</a:t>
             </a:fld>
             <a:endParaRPr lang="en-US"/>
           </a:p>
@@ -2077,7 +2274,7 @@
           <a:p>
             <a:fld id="{6D0E7609-1A7C-1E43-81AD-3B15F6EC7206}" type="datetimeFigureOut">
               <a:rPr lang="en-US" smtClean="0"/>
-              <a:t>10/20/22</a:t>
+              <a:t>10/21/22</a:t>
             </a:fld>
             <a:endParaRPr lang="en-US"/>
           </a:p>
@@ -2388,7 +2585,7 @@
           <a:p>
             <a:fld id="{6D0E7609-1A7C-1E43-81AD-3B15F6EC7206}" type="datetimeFigureOut">
               <a:rPr lang="en-US" smtClean="0"/>
-              <a:t>10/20/22</a:t>
+              <a:t>10/21/22</a:t>
             </a:fld>
             <a:endParaRPr lang="en-US"/>
           </a:p>
@@ -2676,7 +2873,7 @@
           <a:p>
             <a:fld id="{6D0E7609-1A7C-1E43-81AD-3B15F6EC7206}" type="datetimeFigureOut">
               <a:rPr lang="en-US" smtClean="0"/>
-              <a:t>10/20/22</a:t>
+              <a:t>10/21/22</a:t>
             </a:fld>
             <a:endParaRPr lang="en-US"/>
           </a:p>
@@ -2917,7 +3114,7 @@
           <a:p>
             <a:fld id="{6D0E7609-1A7C-1E43-81AD-3B15F6EC7206}" type="datetimeFigureOut">
               <a:rPr lang="en-US" smtClean="0"/>
-              <a:t>10/20/22</a:t>
+              <a:t>10/21/22</a:t>
             </a:fld>
             <a:endParaRPr lang="en-US"/>
           </a:p>
@@ -3715,41 +3912,6 @@
       </p:sp>
       <p:sp>
         <p:nvSpPr>
-          <p:cNvPr id="19" name="TextBox 18">
-            <a:extLst>
-              <a:ext uri="{FF2B5EF4-FFF2-40B4-BE49-F238E27FC236}">
-                <a16:creationId xmlns:a16="http://schemas.microsoft.com/office/drawing/2014/main" id="{C671B9FB-B10D-5853-FC39-4560C395E64B}"/>
-              </a:ext>
-            </a:extLst>
-          </p:cNvPr>
-          <p:cNvSpPr txBox="1"/>
-          <p:nvPr/>
-        </p:nvSpPr>
-        <p:spPr>
-          <a:xfrm>
-            <a:off x="10231247" y="3100861"/>
-            <a:ext cx="1532238" cy="923330"/>
-          </a:xfrm>
-          <a:prstGeom prst="rect">
-            <a:avLst/>
-          </a:prstGeom>
-          <a:noFill/>
-        </p:spPr>
-        <p:txBody>
-          <a:bodyPr wrap="square" rtlCol="0">
-            <a:spAutoFit/>
-          </a:bodyPr>
-          <a:lstStyle/>
-          <a:p>
-            <a:r>
-              <a:rPr lang="en-US" dirty="0"/>
-              <a:t>JTA:number of Junit test assertions</a:t>
-            </a:r>
-          </a:p>
-        </p:txBody>
-      </p:sp>
-      <p:sp>
-        <p:nvSpPr>
           <p:cNvPr id="20" name="TextBox 19">
             <a:extLst>
               <a:ext uri="{FF2B5EF4-FFF2-40B4-BE49-F238E27FC236}">
@@ -3918,7 +4080,7 @@
         </p:nvSpPr>
         <p:spPr>
           <a:xfrm>
-            <a:off x="4105255" y="3580538"/>
+            <a:off x="6053405" y="5132187"/>
             <a:ext cx="647366" cy="369332"/>
           </a:xfrm>
           <a:prstGeom prst="rect">
@@ -3956,9 +4118,9 @@
           <p:nvPr/>
         </p:nvCxnSpPr>
         <p:spPr>
-          <a:xfrm flipH="1">
-            <a:off x="4428938" y="2307287"/>
-            <a:ext cx="620929" cy="1273251"/>
+          <a:xfrm>
+            <a:off x="5049867" y="2307287"/>
+            <a:ext cx="1327221" cy="2824900"/>
           </a:xfrm>
           <a:prstGeom prst="straightConnector1">
             <a:avLst/>
@@ -4068,49 +4230,6 @@
           </a:fontRef>
         </p:style>
       </p:cxnSp>
-      <p:cxnSp>
-        <p:nvCxnSpPr>
-          <p:cNvPr id="34" name="Straight Arrow Connector 33">
-            <a:extLst>
-              <a:ext uri="{FF2B5EF4-FFF2-40B4-BE49-F238E27FC236}">
-                <a16:creationId xmlns:a16="http://schemas.microsoft.com/office/drawing/2014/main" id="{55FB8443-B16F-B6BF-711E-A2BA778EAD97}"/>
-              </a:ext>
-            </a:extLst>
-          </p:cNvPr>
-          <p:cNvCxnSpPr>
-            <a:cxnSpLocks/>
-            <a:stCxn id="8" idx="2"/>
-            <a:endCxn id="19" idx="0"/>
-          </p:cNvCxnSpPr>
-          <p:nvPr/>
-        </p:nvCxnSpPr>
-        <p:spPr>
-          <a:xfrm>
-            <a:off x="10144897" y="2307287"/>
-            <a:ext cx="852469" cy="793574"/>
-          </a:xfrm>
-          <a:prstGeom prst="straightConnector1">
-            <a:avLst/>
-          </a:prstGeom>
-          <a:ln w="31750">
-            <a:tailEnd type="triangle"/>
-          </a:ln>
-        </p:spPr>
-        <p:style>
-          <a:lnRef idx="1">
-            <a:schemeClr val="accent1"/>
-          </a:lnRef>
-          <a:fillRef idx="0">
-            <a:schemeClr val="accent1"/>
-          </a:fillRef>
-          <a:effectRef idx="0">
-            <a:schemeClr val="accent1"/>
-          </a:effectRef>
-          <a:fontRef idx="minor">
-            <a:schemeClr val="tx1"/>
-          </a:fontRef>
-        </p:style>
-      </p:cxnSp>
       <p:sp>
         <p:nvSpPr>
           <p:cNvPr id="37" name="TextBox 36">
@@ -4125,7 +4244,7 @@
         </p:nvSpPr>
         <p:spPr>
           <a:xfrm>
-            <a:off x="5022210" y="3524442"/>
+            <a:off x="5518359" y="2670361"/>
             <a:ext cx="784363" cy="369332"/>
           </a:xfrm>
           <a:prstGeom prst="rect">
@@ -4165,7 +4284,7 @@
         <p:spPr>
           <a:xfrm>
             <a:off x="5049867" y="2307287"/>
-            <a:ext cx="364525" cy="1217155"/>
+            <a:ext cx="860674" cy="363074"/>
           </a:xfrm>
           <a:prstGeom prst="straightConnector1">
             <a:avLst/>
@@ -4203,7 +4322,7 @@
         </p:nvSpPr>
         <p:spPr>
           <a:xfrm>
-            <a:off x="8004015" y="3285527"/>
+            <a:off x="7457690" y="2855027"/>
             <a:ext cx="1532238" cy="923330"/>
           </a:xfrm>
           <a:prstGeom prst="rect">
@@ -4226,24 +4345,24 @@
       </p:sp>
       <p:cxnSp>
         <p:nvCxnSpPr>
-          <p:cNvPr id="13" name="Straight Arrow Connector 12">
-            <a:extLst>
-              <a:ext uri="{FF2B5EF4-FFF2-40B4-BE49-F238E27FC236}">
-                <a16:creationId xmlns:a16="http://schemas.microsoft.com/office/drawing/2014/main" id="{DC5A8EF8-4BBF-63C6-E777-D7A4D0230F65}"/>
+          <p:cNvPr id="48" name="Straight Arrow Connector 47">
+            <a:extLst>
+              <a:ext uri="{FF2B5EF4-FFF2-40B4-BE49-F238E27FC236}">
+                <a16:creationId xmlns:a16="http://schemas.microsoft.com/office/drawing/2014/main" id="{1A031F0C-B445-32E3-DC59-130FA9ED560E}"/>
               </a:ext>
             </a:extLst>
           </p:cNvPr>
           <p:cNvCxnSpPr>
             <a:cxnSpLocks/>
-            <a:stCxn id="8" idx="2"/>
+            <a:stCxn id="7" idx="2"/>
             <a:endCxn id="2" idx="0"/>
           </p:cNvCxnSpPr>
           <p:nvPr/>
         </p:nvCxnSpPr>
         <p:spPr>
-          <a:xfrm flipH="1">
-            <a:off x="8770134" y="2307287"/>
-            <a:ext cx="1374763" cy="978240"/>
+          <a:xfrm>
+            <a:off x="7309021" y="2168787"/>
+            <a:ext cx="914788" cy="686240"/>
           </a:xfrm>
           <a:prstGeom prst="straightConnector1">
             <a:avLst/>
@@ -4269,10 +4388,10 @@
       </p:cxnSp>
       <p:sp>
         <p:nvSpPr>
-          <p:cNvPr id="41" name="TextBox 40">
-            <a:extLst>
-              <a:ext uri="{FF2B5EF4-FFF2-40B4-BE49-F238E27FC236}">
-                <a16:creationId xmlns:a16="http://schemas.microsoft.com/office/drawing/2014/main" id="{DC717E4B-F78E-682C-55B7-3A79E8263304}"/>
+          <p:cNvPr id="52" name="TextBox 51">
+            <a:extLst>
+              <a:ext uri="{FF2B5EF4-FFF2-40B4-BE49-F238E27FC236}">
+                <a16:creationId xmlns:a16="http://schemas.microsoft.com/office/drawing/2014/main" id="{C1FEB23B-3427-A831-6EED-306A6F9BAED5}"/>
               </a:ext>
             </a:extLst>
           </p:cNvPr>
@@ -4281,8 +4400,8 @@
         </p:nvSpPr>
         <p:spPr>
           <a:xfrm>
-            <a:off x="6314303" y="3247443"/>
-            <a:ext cx="1532238" cy="923330"/>
+            <a:off x="2101787" y="4662101"/>
+            <a:ext cx="1750541" cy="646331"/>
           </a:xfrm>
           <a:prstGeom prst="rect">
             <a:avLst/>
@@ -4290,46 +4409,38 @@
           <a:noFill/>
         </p:spPr>
         <p:txBody>
-          <a:bodyPr wrap="square" rtlCol="0">
+          <a:bodyPr wrap="square">
             <a:spAutoFit/>
           </a:bodyPr>
           <a:lstStyle/>
           <a:p>
             <a:r>
               <a:rPr lang="en-US" dirty="0"/>
-              <a:t>Instability</a:t>
-            </a:r>
-            <a:r>
-              <a:rPr lang="en-CA" dirty="0"/>
-              <a:t>:</a:t>
-            </a:r>
-            <a:r>
-              <a:rPr lang="en-US" dirty="0"/>
-              <a:t> range of [0,1]. Ce/(Ca+Ce)</a:t>
+              <a:t>v(G): Cyclomatic complexity</a:t>
             </a:r>
           </a:p>
         </p:txBody>
       </p:sp>
       <p:cxnSp>
         <p:nvCxnSpPr>
-          <p:cNvPr id="42" name="Straight Arrow Connector 41">
-            <a:extLst>
-              <a:ext uri="{FF2B5EF4-FFF2-40B4-BE49-F238E27FC236}">
-                <a16:creationId xmlns:a16="http://schemas.microsoft.com/office/drawing/2014/main" id="{A7A4045D-5C7F-0B54-94F8-BBB971D87690}"/>
+          <p:cNvPr id="62" name="Straight Arrow Connector 61">
+            <a:extLst>
+              <a:ext uri="{FF2B5EF4-FFF2-40B4-BE49-F238E27FC236}">
+                <a16:creationId xmlns:a16="http://schemas.microsoft.com/office/drawing/2014/main" id="{63833FBA-CF6D-12A1-1E94-E18405EC3C37}"/>
               </a:ext>
             </a:extLst>
           </p:cNvPr>
           <p:cNvCxnSpPr>
             <a:cxnSpLocks/>
-            <a:stCxn id="7" idx="2"/>
-            <a:endCxn id="41" idx="0"/>
+            <a:stCxn id="5" idx="2"/>
+            <a:endCxn id="52" idx="0"/>
           </p:cNvCxnSpPr>
           <p:nvPr/>
         </p:nvCxnSpPr>
         <p:spPr>
-          <a:xfrm flipH="1">
-            <a:off x="7080422" y="2168787"/>
-            <a:ext cx="228599" cy="1078656"/>
+          <a:xfrm>
+            <a:off x="2174789" y="2307287"/>
+            <a:ext cx="802269" cy="2354814"/>
           </a:xfrm>
           <a:prstGeom prst="straightConnector1">
             <a:avLst/>
@@ -4355,24 +4466,23 @@
       </p:cxnSp>
       <p:cxnSp>
         <p:nvCxnSpPr>
-          <p:cNvPr id="48" name="Straight Arrow Connector 47">
-            <a:extLst>
-              <a:ext uri="{FF2B5EF4-FFF2-40B4-BE49-F238E27FC236}">
-                <a16:creationId xmlns:a16="http://schemas.microsoft.com/office/drawing/2014/main" id="{1A031F0C-B445-32E3-DC59-130FA9ED560E}"/>
+          <p:cNvPr id="22" name="Straight Arrow Connector 21">
+            <a:extLst>
+              <a:ext uri="{FF2B5EF4-FFF2-40B4-BE49-F238E27FC236}">
+                <a16:creationId xmlns:a16="http://schemas.microsoft.com/office/drawing/2014/main" id="{C7AB4BC3-6003-6DE0-34F4-81420AD4F5DC}"/>
               </a:ext>
             </a:extLst>
           </p:cNvPr>
           <p:cNvCxnSpPr>
-            <a:cxnSpLocks/>
             <a:stCxn id="7" idx="2"/>
-            <a:endCxn id="2" idx="0"/>
+            <a:endCxn id="37" idx="0"/>
           </p:cNvCxnSpPr>
           <p:nvPr/>
         </p:nvCxnSpPr>
         <p:spPr>
-          <a:xfrm>
-            <a:off x="7309021" y="2168787"/>
-            <a:ext cx="1461113" cy="1116740"/>
+          <a:xfrm flipH="1">
+            <a:off x="5910541" y="2168787"/>
+            <a:ext cx="1398480" cy="501574"/>
           </a:xfrm>
           <a:prstGeom prst="straightConnector1">
             <a:avLst/>
@@ -4398,10 +4508,10 @@
       </p:cxnSp>
       <p:sp>
         <p:nvSpPr>
-          <p:cNvPr id="52" name="TextBox 51">
-            <a:extLst>
-              <a:ext uri="{FF2B5EF4-FFF2-40B4-BE49-F238E27FC236}">
-                <a16:creationId xmlns:a16="http://schemas.microsoft.com/office/drawing/2014/main" id="{C1FEB23B-3427-A831-6EED-306A6F9BAED5}"/>
+          <p:cNvPr id="31" name="TextBox 30">
+            <a:extLst>
+              <a:ext uri="{FF2B5EF4-FFF2-40B4-BE49-F238E27FC236}">
+                <a16:creationId xmlns:a16="http://schemas.microsoft.com/office/drawing/2014/main" id="{F2043878-2F25-134B-9F3B-674B90D038B6}"/>
               </a:ext>
             </a:extLst>
           </p:cNvPr>
@@ -4410,8 +4520,8 @@
         </p:nvSpPr>
         <p:spPr>
           <a:xfrm>
-            <a:off x="3989172" y="5077600"/>
-            <a:ext cx="1750541" cy="646331"/>
+            <a:off x="6524367" y="4024191"/>
+            <a:ext cx="1006299" cy="369332"/>
           </a:xfrm>
           <a:prstGeom prst="rect">
             <a:avLst/>
@@ -4419,38 +4529,37 @@
           <a:noFill/>
         </p:spPr>
         <p:txBody>
-          <a:bodyPr wrap="square">
+          <a:bodyPr wrap="square" rtlCol="0">
             <a:spAutoFit/>
           </a:bodyPr>
           <a:lstStyle/>
           <a:p>
             <a:r>
               <a:rPr lang="en-US" dirty="0"/>
-              <a:t>v(G): Cyclomatic complexity</a:t>
+              <a:t>NOC</a:t>
             </a:r>
           </a:p>
         </p:txBody>
       </p:sp>
       <p:cxnSp>
         <p:nvCxnSpPr>
-          <p:cNvPr id="59" name="Straight Arrow Connector 58">
-            <a:extLst>
-              <a:ext uri="{FF2B5EF4-FFF2-40B4-BE49-F238E27FC236}">
-                <a16:creationId xmlns:a16="http://schemas.microsoft.com/office/drawing/2014/main" id="{EE0133F3-29AD-1597-1469-D5131105E5BC}"/>
+          <p:cNvPr id="35" name="Straight Arrow Connector 34">
+            <a:extLst>
+              <a:ext uri="{FF2B5EF4-FFF2-40B4-BE49-F238E27FC236}">
+                <a16:creationId xmlns:a16="http://schemas.microsoft.com/office/drawing/2014/main" id="{25C28540-545C-B7D6-FFFC-BDE3967FB0B6}"/>
               </a:ext>
             </a:extLst>
           </p:cNvPr>
           <p:cNvCxnSpPr>
-            <a:cxnSpLocks/>
-            <a:stCxn id="7" idx="2"/>
-            <a:endCxn id="52" idx="0"/>
+            <a:stCxn id="6" idx="2"/>
+            <a:endCxn id="31" idx="1"/>
           </p:cNvCxnSpPr>
           <p:nvPr/>
         </p:nvCxnSpPr>
         <p:spPr>
-          <a:xfrm flipH="1">
-            <a:off x="4864443" y="2168787"/>
-            <a:ext cx="2444578" cy="2908813"/>
+          <a:xfrm>
+            <a:off x="5049867" y="2307287"/>
+            <a:ext cx="1474500" cy="1901570"/>
           </a:xfrm>
           <a:prstGeom prst="straightConnector1">
             <a:avLst/>
@@ -4476,24 +4585,184 @@
       </p:cxnSp>
       <p:cxnSp>
         <p:nvCxnSpPr>
-          <p:cNvPr id="62" name="Straight Arrow Connector 61">
-            <a:extLst>
-              <a:ext uri="{FF2B5EF4-FFF2-40B4-BE49-F238E27FC236}">
-                <a16:creationId xmlns:a16="http://schemas.microsoft.com/office/drawing/2014/main" id="{63833FBA-CF6D-12A1-1E94-E18405EC3C37}"/>
+          <p:cNvPr id="38" name="Straight Arrow Connector 37">
+            <a:extLst>
+              <a:ext uri="{FF2B5EF4-FFF2-40B4-BE49-F238E27FC236}">
+                <a16:creationId xmlns:a16="http://schemas.microsoft.com/office/drawing/2014/main" id="{FE9BF910-F7B0-5DA0-201C-1B4E4298E8F1}"/>
               </a:ext>
             </a:extLst>
           </p:cNvPr>
           <p:cNvCxnSpPr>
-            <a:cxnSpLocks/>
-            <a:stCxn id="5" idx="2"/>
-            <a:endCxn id="52" idx="0"/>
+            <a:stCxn id="8" idx="2"/>
+            <a:endCxn id="31" idx="3"/>
           </p:cNvCxnSpPr>
           <p:nvPr/>
         </p:nvCxnSpPr>
         <p:spPr>
+          <a:xfrm flipH="1">
+            <a:off x="7530666" y="2307287"/>
+            <a:ext cx="2614231" cy="1901570"/>
+          </a:xfrm>
+          <a:prstGeom prst="straightConnector1">
+            <a:avLst/>
+          </a:prstGeom>
+          <a:ln w="31750">
+            <a:tailEnd type="triangle"/>
+          </a:ln>
+        </p:spPr>
+        <p:style>
+          <a:lnRef idx="1">
+            <a:schemeClr val="accent1"/>
+          </a:lnRef>
+          <a:fillRef idx="0">
+            <a:schemeClr val="accent1"/>
+          </a:fillRef>
+          <a:effectRef idx="0">
+            <a:schemeClr val="accent1"/>
+          </a:effectRef>
+          <a:fontRef idx="minor">
+            <a:schemeClr val="tx1"/>
+          </a:fontRef>
+        </p:style>
+      </p:cxnSp>
+      <p:sp>
+        <p:nvSpPr>
+          <p:cNvPr id="40" name="TextBox 39">
+            <a:extLst>
+              <a:ext uri="{FF2B5EF4-FFF2-40B4-BE49-F238E27FC236}">
+                <a16:creationId xmlns:a16="http://schemas.microsoft.com/office/drawing/2014/main" id="{035A5DDB-34B8-D20D-C9CA-2663EF09E8DE}"/>
+              </a:ext>
+            </a:extLst>
+          </p:cNvPr>
+          <p:cNvSpPr txBox="1"/>
+          <p:nvPr/>
+        </p:nvSpPr>
+        <p:spPr>
+          <a:xfrm>
+            <a:off x="6700771" y="6211441"/>
+            <a:ext cx="536878" cy="369332"/>
+          </a:xfrm>
+          <a:prstGeom prst="rect">
+            <a:avLst/>
+          </a:prstGeom>
+          <a:noFill/>
+        </p:spPr>
+        <p:txBody>
+          <a:bodyPr wrap="none" rtlCol="0">
+            <a:spAutoFit/>
+          </a:bodyPr>
+          <a:lstStyle/>
+          <a:p>
+            <a:r>
+              <a:rPr lang="en-US" dirty="0"/>
+              <a:t>RFC</a:t>
+            </a:r>
+          </a:p>
+        </p:txBody>
+      </p:sp>
+      <p:cxnSp>
+        <p:nvCxnSpPr>
+          <p:cNvPr id="44" name="Straight Arrow Connector 43">
+            <a:extLst>
+              <a:ext uri="{FF2B5EF4-FFF2-40B4-BE49-F238E27FC236}">
+                <a16:creationId xmlns:a16="http://schemas.microsoft.com/office/drawing/2014/main" id="{FFCEC94D-43C6-9CEB-54C2-A3CC36EAE832}"/>
+              </a:ext>
+            </a:extLst>
+          </p:cNvPr>
+          <p:cNvCxnSpPr>
+            <a:stCxn id="8" idx="2"/>
+            <a:endCxn id="40" idx="3"/>
+          </p:cNvCxnSpPr>
+          <p:nvPr/>
+        </p:nvCxnSpPr>
+        <p:spPr>
+          <a:xfrm flipH="1">
+            <a:off x="7237649" y="2307287"/>
+            <a:ext cx="2907248" cy="4088820"/>
+          </a:xfrm>
+          <a:prstGeom prst="straightConnector1">
+            <a:avLst/>
+          </a:prstGeom>
+          <a:ln w="31750">
+            <a:tailEnd type="triangle"/>
+          </a:ln>
+        </p:spPr>
+        <p:style>
+          <a:lnRef idx="1">
+            <a:schemeClr val="accent1"/>
+          </a:lnRef>
+          <a:fillRef idx="0">
+            <a:schemeClr val="accent1"/>
+          </a:fillRef>
+          <a:effectRef idx="0">
+            <a:schemeClr val="accent1"/>
+          </a:effectRef>
+          <a:fontRef idx="minor">
+            <a:schemeClr val="tx1"/>
+          </a:fontRef>
+        </p:style>
+      </p:cxnSp>
+      <p:cxnSp>
+        <p:nvCxnSpPr>
+          <p:cNvPr id="46" name="Straight Arrow Connector 45">
+            <a:extLst>
+              <a:ext uri="{FF2B5EF4-FFF2-40B4-BE49-F238E27FC236}">
+                <a16:creationId xmlns:a16="http://schemas.microsoft.com/office/drawing/2014/main" id="{6B00420F-7C2C-89F2-70E3-3441A22A73B0}"/>
+              </a:ext>
+            </a:extLst>
+          </p:cNvPr>
+          <p:cNvCxnSpPr>
+            <a:stCxn id="5" idx="2"/>
+            <a:endCxn id="40" idx="1"/>
+          </p:cNvCxnSpPr>
+          <p:nvPr/>
+        </p:nvCxnSpPr>
+        <p:spPr>
           <a:xfrm>
             <a:off x="2174789" y="2307287"/>
-            <a:ext cx="2689654" cy="2770313"/>
+            <a:ext cx="4525982" cy="4088820"/>
+          </a:xfrm>
+          <a:prstGeom prst="straightConnector1">
+            <a:avLst/>
+          </a:prstGeom>
+          <a:ln w="31750">
+            <a:tailEnd type="triangle"/>
+          </a:ln>
+        </p:spPr>
+        <p:style>
+          <a:lnRef idx="1">
+            <a:schemeClr val="accent1"/>
+          </a:lnRef>
+          <a:fillRef idx="0">
+            <a:schemeClr val="accent1"/>
+          </a:fillRef>
+          <a:effectRef idx="0">
+            <a:schemeClr val="accent1"/>
+          </a:effectRef>
+          <a:fontRef idx="minor">
+            <a:schemeClr val="tx1"/>
+          </a:fontRef>
+        </p:style>
+      </p:cxnSp>
+      <p:cxnSp>
+        <p:nvCxnSpPr>
+          <p:cNvPr id="53" name="Straight Arrow Connector 52">
+            <a:extLst>
+              <a:ext uri="{FF2B5EF4-FFF2-40B4-BE49-F238E27FC236}">
+                <a16:creationId xmlns:a16="http://schemas.microsoft.com/office/drawing/2014/main" id="{82365185-0A29-35BD-8AD6-CB5C90CB14C9}"/>
+              </a:ext>
+            </a:extLst>
+          </p:cNvPr>
+          <p:cNvCxnSpPr>
+            <a:stCxn id="8" idx="2"/>
+            <a:endCxn id="26" idx="3"/>
+          </p:cNvCxnSpPr>
+          <p:nvPr/>
+        </p:nvCxnSpPr>
+        <p:spPr>
+          <a:xfrm flipH="1">
+            <a:off x="6700771" y="2307287"/>
+            <a:ext cx="3444126" cy="3009566"/>
           </a:xfrm>
           <a:prstGeom prst="straightConnector1">
             <a:avLst/>

</xml_diff>